<commit_message>
created branch for generating SE instructions video
</commit_message>
<xml_diff>
--- a/src/SE_glioma/Stimuli/Instructions_new_patient.pptx
+++ b/src/SE_glioma/Stimuli/Instructions_new_patient.pptx
@@ -230,7 +230,7 @@
           <a:p>
             <a:fld id="{457B588A-FAB3-4C3F-A999-7E77BA0B8118}" type="datetimeFigureOut">
               <a:rPr lang="en-GB" smtClean="0"/>
-              <a:t>24/11/2021</a:t>
+              <a:t>02/12/2021</a:t>
             </a:fld>
             <a:endParaRPr lang="en-GB"/>
           </a:p>
@@ -296,7 +296,7 @@
           <a:p>
             <a:fld id="{756993CC-A683-496E-881E-006544134775}" type="slidenum">
               <a:rPr lang="en-GB" smtClean="0"/>
-              <a:t>‹#›</a:t>
+              <a:t>‹N°›</a:t>
             </a:fld>
             <a:endParaRPr lang="en-GB"/>
           </a:p>
@@ -444,7 +444,7 @@
           <a:p>
             <a:fld id="{1C2A38D2-D57A-4E64-B95F-0826012D069A}" type="datetimeFigureOut">
               <a:rPr lang="en-GB" smtClean="0"/>
-              <a:t>24/11/2021</a:t>
+              <a:t>02/12/2021</a:t>
             </a:fld>
             <a:endParaRPr lang="en-GB" dirty="0"/>
           </a:p>
@@ -486,7 +486,7 @@
           <a:p>
             <a:fld id="{9D7F7A4F-C86B-4E97-8396-79EF10BBD040}" type="slidenum">
               <a:rPr lang="en-GB" smtClean="0"/>
-              <a:t>‹#›</a:t>
+              <a:t>‹N°›</a:t>
             </a:fld>
             <a:endParaRPr lang="en-GB" dirty="0"/>
           </a:p>
@@ -614,7 +614,7 @@
           <a:p>
             <a:fld id="{1C2A38D2-D57A-4E64-B95F-0826012D069A}" type="datetimeFigureOut">
               <a:rPr lang="en-GB" smtClean="0"/>
-              <a:t>24/11/2021</a:t>
+              <a:t>02/12/2021</a:t>
             </a:fld>
             <a:endParaRPr lang="en-GB" dirty="0"/>
           </a:p>
@@ -656,7 +656,7 @@
           <a:p>
             <a:fld id="{9D7F7A4F-C86B-4E97-8396-79EF10BBD040}" type="slidenum">
               <a:rPr lang="en-GB" smtClean="0"/>
-              <a:t>‹#›</a:t>
+              <a:t>‹N°›</a:t>
             </a:fld>
             <a:endParaRPr lang="en-GB" dirty="0"/>
           </a:p>
@@ -794,7 +794,7 @@
           <a:p>
             <a:fld id="{1C2A38D2-D57A-4E64-B95F-0826012D069A}" type="datetimeFigureOut">
               <a:rPr lang="en-GB" smtClean="0"/>
-              <a:t>24/11/2021</a:t>
+              <a:t>02/12/2021</a:t>
             </a:fld>
             <a:endParaRPr lang="en-GB" dirty="0"/>
           </a:p>
@@ -836,7 +836,7 @@
           <a:p>
             <a:fld id="{9D7F7A4F-C86B-4E97-8396-79EF10BBD040}" type="slidenum">
               <a:rPr lang="en-GB" smtClean="0"/>
-              <a:t>‹#›</a:t>
+              <a:t>‹N°›</a:t>
             </a:fld>
             <a:endParaRPr lang="en-GB" dirty="0"/>
           </a:p>
@@ -964,7 +964,7 @@
           <a:p>
             <a:fld id="{1C2A38D2-D57A-4E64-B95F-0826012D069A}" type="datetimeFigureOut">
               <a:rPr lang="en-GB" smtClean="0"/>
-              <a:t>24/11/2021</a:t>
+              <a:t>02/12/2021</a:t>
             </a:fld>
             <a:endParaRPr lang="en-GB" dirty="0"/>
           </a:p>
@@ -1006,7 +1006,7 @@
           <a:p>
             <a:fld id="{9D7F7A4F-C86B-4E97-8396-79EF10BBD040}" type="slidenum">
               <a:rPr lang="en-GB" smtClean="0"/>
-              <a:t>‹#›</a:t>
+              <a:t>‹N°›</a:t>
             </a:fld>
             <a:endParaRPr lang="en-GB" dirty="0"/>
           </a:p>
@@ -1210,7 +1210,7 @@
           <a:p>
             <a:fld id="{1C2A38D2-D57A-4E64-B95F-0826012D069A}" type="datetimeFigureOut">
               <a:rPr lang="en-GB" smtClean="0"/>
-              <a:t>24/11/2021</a:t>
+              <a:t>02/12/2021</a:t>
             </a:fld>
             <a:endParaRPr lang="en-GB" dirty="0"/>
           </a:p>
@@ -1252,7 +1252,7 @@
           <a:p>
             <a:fld id="{9D7F7A4F-C86B-4E97-8396-79EF10BBD040}" type="slidenum">
               <a:rPr lang="en-GB" smtClean="0"/>
-              <a:t>‹#›</a:t>
+              <a:t>‹N°›</a:t>
             </a:fld>
             <a:endParaRPr lang="en-GB" dirty="0"/>
           </a:p>
@@ -1442,7 +1442,7 @@
           <a:p>
             <a:fld id="{1C2A38D2-D57A-4E64-B95F-0826012D069A}" type="datetimeFigureOut">
               <a:rPr lang="en-GB" smtClean="0"/>
-              <a:t>24/11/2021</a:t>
+              <a:t>02/12/2021</a:t>
             </a:fld>
             <a:endParaRPr lang="en-GB" dirty="0"/>
           </a:p>
@@ -1484,7 +1484,7 @@
           <a:p>
             <a:fld id="{9D7F7A4F-C86B-4E97-8396-79EF10BBD040}" type="slidenum">
               <a:rPr lang="en-GB" smtClean="0"/>
-              <a:t>‹#›</a:t>
+              <a:t>‹N°›</a:t>
             </a:fld>
             <a:endParaRPr lang="en-GB" dirty="0"/>
           </a:p>
@@ -1809,7 +1809,7 @@
           <a:p>
             <a:fld id="{1C2A38D2-D57A-4E64-B95F-0826012D069A}" type="datetimeFigureOut">
               <a:rPr lang="en-GB" smtClean="0"/>
-              <a:t>24/11/2021</a:t>
+              <a:t>02/12/2021</a:t>
             </a:fld>
             <a:endParaRPr lang="en-GB" dirty="0"/>
           </a:p>
@@ -1851,7 +1851,7 @@
           <a:p>
             <a:fld id="{9D7F7A4F-C86B-4E97-8396-79EF10BBD040}" type="slidenum">
               <a:rPr lang="en-GB" smtClean="0"/>
-              <a:t>‹#›</a:t>
+              <a:t>‹N°›</a:t>
             </a:fld>
             <a:endParaRPr lang="en-GB" dirty="0"/>
           </a:p>
@@ -1927,7 +1927,7 @@
           <a:p>
             <a:fld id="{1C2A38D2-D57A-4E64-B95F-0826012D069A}" type="datetimeFigureOut">
               <a:rPr lang="en-GB" smtClean="0"/>
-              <a:t>24/11/2021</a:t>
+              <a:t>02/12/2021</a:t>
             </a:fld>
             <a:endParaRPr lang="en-GB" dirty="0"/>
           </a:p>
@@ -1969,7 +1969,7 @@
           <a:p>
             <a:fld id="{9D7F7A4F-C86B-4E97-8396-79EF10BBD040}" type="slidenum">
               <a:rPr lang="en-GB" smtClean="0"/>
-              <a:t>‹#›</a:t>
+              <a:t>‹N°›</a:t>
             </a:fld>
             <a:endParaRPr lang="en-GB" dirty="0"/>
           </a:p>
@@ -2022,7 +2022,7 @@
           <a:p>
             <a:fld id="{1C2A38D2-D57A-4E64-B95F-0826012D069A}" type="datetimeFigureOut">
               <a:rPr lang="en-GB" smtClean="0"/>
-              <a:t>24/11/2021</a:t>
+              <a:t>02/12/2021</a:t>
             </a:fld>
             <a:endParaRPr lang="en-GB" dirty="0"/>
           </a:p>
@@ -2064,7 +2064,7 @@
           <a:p>
             <a:fld id="{9D7F7A4F-C86B-4E97-8396-79EF10BBD040}" type="slidenum">
               <a:rPr lang="en-GB" smtClean="0"/>
-              <a:t>‹#›</a:t>
+              <a:t>‹N°›</a:t>
             </a:fld>
             <a:endParaRPr lang="en-GB" dirty="0"/>
           </a:p>
@@ -2299,7 +2299,7 @@
           <a:p>
             <a:fld id="{1C2A38D2-D57A-4E64-B95F-0826012D069A}" type="datetimeFigureOut">
               <a:rPr lang="en-GB" smtClean="0"/>
-              <a:t>24/11/2021</a:t>
+              <a:t>02/12/2021</a:t>
             </a:fld>
             <a:endParaRPr lang="en-GB" dirty="0"/>
           </a:p>
@@ -2341,7 +2341,7 @@
           <a:p>
             <a:fld id="{9D7F7A4F-C86B-4E97-8396-79EF10BBD040}" type="slidenum">
               <a:rPr lang="en-GB" smtClean="0"/>
-              <a:t>‹#›</a:t>
+              <a:t>‹N°›</a:t>
             </a:fld>
             <a:endParaRPr lang="en-GB" dirty="0"/>
           </a:p>
@@ -2552,7 +2552,7 @@
           <a:p>
             <a:fld id="{1C2A38D2-D57A-4E64-B95F-0826012D069A}" type="datetimeFigureOut">
               <a:rPr lang="en-GB" smtClean="0"/>
-              <a:t>24/11/2021</a:t>
+              <a:t>02/12/2021</a:t>
             </a:fld>
             <a:endParaRPr lang="en-GB" dirty="0"/>
           </a:p>
@@ -2594,7 +2594,7 @@
           <a:p>
             <a:fld id="{9D7F7A4F-C86B-4E97-8396-79EF10BBD040}" type="slidenum">
               <a:rPr lang="en-GB" smtClean="0"/>
-              <a:t>‹#›</a:t>
+              <a:t>‹N°›</a:t>
             </a:fld>
             <a:endParaRPr lang="en-GB" dirty="0"/>
           </a:p>
@@ -2765,7 +2765,7 @@
           <a:p>
             <a:fld id="{1C2A38D2-D57A-4E64-B95F-0826012D069A}" type="datetimeFigureOut">
               <a:rPr lang="en-GB" smtClean="0"/>
-              <a:t>24/11/2021</a:t>
+              <a:t>02/12/2021</a:t>
             </a:fld>
             <a:endParaRPr lang="en-GB" dirty="0"/>
           </a:p>
@@ -2843,7 +2843,7 @@
           <a:p>
             <a:fld id="{9D7F7A4F-C86B-4E97-8396-79EF10BBD040}" type="slidenum">
               <a:rPr lang="en-GB" smtClean="0"/>
-              <a:t>‹#›</a:t>
+              <a:t>‹N°›</a:t>
             </a:fld>
             <a:endParaRPr lang="en-GB" dirty="0"/>
           </a:p>
@@ -3255,11 +3255,11 @@
               </a:lnSpc>
             </a:pPr>
             <a:r>
-              <a:rPr lang="en-GB" sz="2400" dirty="0" err="1"/>
+              <a:rPr lang="en-GB" sz="2400" dirty="0" err="1" smtClean="0"/>
               <a:t>Veuillez</a:t>
             </a:r>
             <a:r>
-              <a:rPr lang="en-GB" sz="2400" dirty="0"/>
+              <a:rPr lang="en-GB" sz="2400" dirty="0" smtClean="0"/>
               <a:t> lire </a:t>
             </a:r>
             <a:r>

</xml_diff>

<commit_message>
created sequence of "trials" to record instruction video
</commit_message>
<xml_diff>
--- a/src/SE_glioma/Stimuli/Instructions_new_patient.pptx
+++ b/src/SE_glioma/Stimuli/Instructions_new_patient.pptx
@@ -3474,7 +3474,7 @@
               </a:spcAft>
             </a:pPr>
             <a:r>
-              <a:rPr lang="fr-FR" sz="2400" dirty="0"/>
+              <a:rPr lang="fr-FR" sz="2400" dirty="0" smtClean="0"/>
               <a:t>Si le score cible est élevé, vous aurez sûrement besoin de visualiser les chiffres de la grille un grand nombre de fois.</a:t>
             </a:r>
           </a:p>
@@ -3485,9 +3485,10 @@
               </a:spcAft>
             </a:pPr>
             <a:r>
-              <a:rPr lang="fr-FR" sz="2400" dirty="0"/>
+              <a:rPr lang="fr-FR" sz="2400" dirty="0" smtClean="0"/>
               <a:t>Vous pourrez déplacer la barre vers la gauche et la droite en utilisant respectivement les flèches gauche et droite du clavier:</a:t>
             </a:r>
+            <a:endParaRPr lang="fr-FR" sz="2400" dirty="0"/>
           </a:p>
         </p:txBody>
       </p:sp>
@@ -9290,7 +9291,15 @@
             </a:pPr>
             <a:r>
               <a:rPr lang="fr-FR" sz="2400" dirty="0"/>
-              <a:t>Sinon, vous pourrez cliquer sur le bouton « Non » et passer à</a:t>
+              <a:t>Sinon, vous pourrez </a:t>
+            </a:r>
+            <a:r>
+              <a:rPr lang="fr-FR" sz="2400" dirty="0" smtClean="0"/>
+              <a:t>cliquez </a:t>
+            </a:r>
+            <a:r>
+              <a:rPr lang="fr-FR" sz="2400" dirty="0"/>
+              <a:t>sur le bouton « Non » et passer à</a:t>
             </a:r>
             <a:r>
               <a:rPr lang="en-GB" sz="2400" dirty="0"/>
@@ -10446,7 +10455,15 @@
             </a:pPr>
             <a:r>
               <a:rPr lang="fr-FR" sz="2400" dirty="0"/>
-              <a:t>Vous pourrez alors cliquer sur le bouton « Montrez-moi la prochaine paire », en bas à gauche de la grille:</a:t>
+              <a:t>Vous pourrez alors cliquer sur le bouton « Montrez-moi la prochaine paire », en </a:t>
+            </a:r>
+            <a:r>
+              <a:rPr lang="fr-FR" sz="2400" dirty="0" smtClean="0"/>
+              <a:t>bas de </a:t>
+            </a:r>
+            <a:r>
+              <a:rPr lang="fr-FR" sz="2400" dirty="0"/>
+              <a:t>la grille:</a:t>
             </a:r>
             <a:endParaRPr lang="fr-FR" sz="2400" b="1" dirty="0"/>
           </a:p>
@@ -13722,7 +13739,11 @@
               </a:r>
               <a:r>
                 <a:rPr lang="en-GB" sz="2400" dirty="0"/>
-                <a:t> 12 </a:t>
+                <a:t> </a:t>
+              </a:r>
+              <a:r>
+                <a:rPr lang="en-GB" sz="2400" dirty="0" smtClean="0"/>
+                <a:t>25 </a:t>
               </a:r>
               <a:r>
                 <a:rPr lang="en-GB" sz="2400" dirty="0" err="1"/>
@@ -13833,67 +13854,67 @@
             <a:p>
               <a:pPr algn="ctr"/>
               <a:r>
-                <a:rPr lang="en-GB" sz="2400" dirty="0" err="1"/>
+                <a:rPr lang="en-GB" sz="2400" dirty="0" err="1" smtClean="0"/>
                 <a:t>Relisez</a:t>
               </a:r>
               <a:r>
-                <a:rPr lang="en-GB" sz="2400" dirty="0"/>
+                <a:rPr lang="en-GB" sz="2400" dirty="0" smtClean="0"/>
                 <a:t> </a:t>
               </a:r>
               <a:r>
-                <a:rPr lang="en-GB" sz="2400" dirty="0" err="1"/>
+                <a:rPr lang="en-GB" sz="2400" dirty="0" err="1" smtClean="0"/>
                 <a:t>ces</a:t>
               </a:r>
               <a:r>
-                <a:rPr lang="en-GB" sz="2400" dirty="0"/>
+                <a:rPr lang="en-GB" sz="2400" dirty="0" smtClean="0"/>
                 <a:t> instructions </a:t>
               </a:r>
               <a:r>
-                <a:rPr lang="en-GB" sz="2400" dirty="0" err="1"/>
+                <a:rPr lang="en-GB" sz="2400" dirty="0" err="1" smtClean="0"/>
                 <a:t>jusqu’à</a:t>
               </a:r>
               <a:r>
-                <a:rPr lang="en-GB" sz="2400" dirty="0"/>
+                <a:rPr lang="en-GB" sz="2400" dirty="0" smtClean="0"/>
                 <a:t> </a:t>
               </a:r>
               <a:r>
-                <a:rPr lang="en-GB" sz="2400" dirty="0" err="1"/>
+                <a:rPr lang="en-GB" sz="2400" dirty="0" err="1" smtClean="0"/>
                 <a:t>ce</a:t>
               </a:r>
               <a:r>
-                <a:rPr lang="en-GB" sz="2400" dirty="0"/>
+                <a:rPr lang="en-GB" sz="2400" dirty="0" smtClean="0"/>
                 <a:t> </a:t>
               </a:r>
               <a:r>
-                <a:rPr lang="en-GB" sz="2400" dirty="0" err="1"/>
+                <a:rPr lang="en-GB" sz="2400" dirty="0" err="1" smtClean="0"/>
                 <a:t>qu’elles</a:t>
               </a:r>
               <a:r>
-                <a:rPr lang="en-GB" sz="2400" dirty="0"/>
+                <a:rPr lang="en-GB" sz="2400" dirty="0" smtClean="0"/>
                 <a:t> </a:t>
               </a:r>
               <a:r>
-                <a:rPr lang="en-GB" sz="2400" dirty="0" err="1"/>
+                <a:rPr lang="en-GB" sz="2400" dirty="0" err="1" smtClean="0"/>
                 <a:t>soient</a:t>
               </a:r>
               <a:r>
-                <a:rPr lang="en-GB" sz="2400" dirty="0"/>
+                <a:rPr lang="en-GB" sz="2400" dirty="0" smtClean="0"/>
                 <a:t> </a:t>
               </a:r>
               <a:r>
-                <a:rPr lang="en-GB" sz="2400" dirty="0" err="1"/>
+                <a:rPr lang="en-GB" sz="2400" dirty="0" err="1" smtClean="0"/>
                 <a:t>parfaitement</a:t>
               </a:r>
               <a:r>
-                <a:rPr lang="en-GB" sz="2400" dirty="0"/>
+                <a:rPr lang="en-GB" sz="2400" dirty="0" smtClean="0"/>
                 <a:t> </a:t>
               </a:r>
               <a:r>
-                <a:rPr lang="en-GB" sz="2400" dirty="0" err="1"/>
+                <a:rPr lang="en-GB" sz="2400" dirty="0" err="1" smtClean="0"/>
                 <a:t>claires</a:t>
               </a:r>
               <a:r>
-                <a:rPr lang="en-GB" sz="2400" dirty="0"/>
+                <a:rPr lang="en-GB" sz="2400" dirty="0" smtClean="0"/>
                 <a:t>.</a:t>
               </a:r>
             </a:p>
@@ -14148,8 +14169,13 @@
             </a:pPr>
             <a:r>
               <a:rPr lang="fr-FR" sz="2400" dirty="0"/>
-              <a:t>Nous vous montrerons la grille une fois et puis nous vous demanderons d’imaginer combien d’effort cela vous demanderait pour atteindre différents scores.</a:t>
-            </a:r>
+              <a:t>Nous vous montrerons la grille une fois et puis nous vous demanderons d’imaginer combien d’effort cela vous demanderait pour atteindre différents scores</a:t>
+            </a:r>
+            <a:r>
+              <a:rPr lang="fr-FR" sz="2400" dirty="0" smtClean="0"/>
+              <a:t>.</a:t>
+            </a:r>
+            <a:endParaRPr lang="fr-FR" sz="2400" dirty="0"/>
           </a:p>
           <a:p>
             <a:pPr algn="ctr">

</xml_diff>

<commit_message>
final changes to text
</commit_message>
<xml_diff>
--- a/src/SE_glioma/Stimuli/Instructions_new_patient.pptx
+++ b/src/SE_glioma/Stimuli/Instructions_new_patient.pptx
@@ -13725,7 +13725,7 @@
               </a:r>
               <a:r>
                 <a:rPr lang="en-GB" sz="2400" dirty="0" err="1"/>
-                <a:t>mémorisation</a:t>
+                <a:t>mémoire</a:t>
               </a:r>
               <a:r>
                 <a:rPr lang="en-GB" sz="2400" dirty="0"/>
@@ -13744,7 +13744,7 @@
               </a:r>
               <a:r>
                 <a:rPr lang="en-GB" sz="2400" dirty="0" err="1"/>
-                <a:t>mémorisation</a:t>
+                <a:t>mémoire</a:t>
               </a:r>
               <a:r>
                 <a:rPr lang="fr-FR" sz="2400" dirty="0"/>

</xml_diff>